<commit_message>
fix irreducible error on slide 11
</commit_message>
<xml_diff>
--- a/multipleRegression/10b_linearRegressionDarren.pptx
+++ b/multipleRegression/10b_linearRegressionDarren.pptx
@@ -4705,6 +4705,13 @@
   <p:clrMapOvr>
     <a:masterClrMapping/>
   </p:clrMapOvr>
+  <p:timing>
+    <p:tnLst>
+      <p:par>
+        <p:cTn id="1" dur="indefinite" restart="never" nodeType="tmRoot"/>
+      </p:par>
+    </p:tnLst>
+  </p:timing>
 </p:sld>
 </file>
 
@@ -4768,7 +4775,7 @@
             </p:spPr>
             <p:txBody>
               <a:bodyPr>
-                <a:normAutofit/>
+                <a:normAutofit fontScale="92500" lnSpcReduction="10000"/>
               </a:bodyPr>
               <a:lstStyle/>
               <a:p>
@@ -5679,56 +5686,7 @@
                 <a14:m>
                   <m:oMath xmlns:m="http://schemas.openxmlformats.org/officeDocument/2006/math">
                     <m:r>
-                      <a:rPr lang="en-US" i="1">
-                        <a:latin typeface="Cambria Math" charset="0"/>
-                        <a:ea typeface="Cambria Math" charset="0"/>
-                        <a:cs typeface="Cambria Math" charset="0"/>
-                      </a:rPr>
-                      <m:t>𝜇</m:t>
-                    </m:r>
-                    <m:d>
-                      <m:dPr>
-                        <m:begChr m:val="{"/>
-                        <m:endChr m:val="}"/>
-                        <m:ctrlPr>
-                          <a:rPr lang="en-US" i="1">
-                            <a:latin typeface="Cambria Math" charset="0"/>
-                            <a:ea typeface="Cambria Math" charset="0"/>
-                            <a:cs typeface="Cambria Math" charset="0"/>
-                          </a:rPr>
-                        </m:ctrlPr>
-                      </m:dPr>
-                      <m:e>
-                        <m:r>
-                          <a:rPr lang="en-US" i="1">
-                            <a:latin typeface="Cambria Math" charset="0"/>
-                            <a:ea typeface="Cambria Math" charset="0"/>
-                            <a:cs typeface="Cambria Math" charset="0"/>
-                          </a:rPr>
-                          <m:t>𝑌</m:t>
-                        </m:r>
-                      </m:e>
-                      <m:e>
-                        <m:r>
-                          <a:rPr lang="en-US" i="1">
-                            <a:latin typeface="Cambria Math" charset="0"/>
-                            <a:ea typeface="Cambria Math" charset="0"/>
-                            <a:cs typeface="Cambria Math" charset="0"/>
-                          </a:rPr>
-                          <m:t>𝑋</m:t>
-                        </m:r>
-                      </m:e>
-                    </m:d>
-                    <m:r>
-                      <a:rPr lang="en-US" b="0" i="0" smtClean="0">
-                        <a:latin typeface="Cambria Math" charset="0"/>
-                        <a:ea typeface="Cambria Math" charset="0"/>
-                        <a:cs typeface="Cambria Math" charset="0"/>
-                      </a:rPr>
-                      <m:t>−</m:t>
-                    </m:r>
-                    <m:r>
-                      <a:rPr lang="en-US" i="1">
+                      <a:rPr lang="en-US" i="1" smtClean="0">
                         <a:latin typeface="Cambria Math" charset="0"/>
                         <a:ea typeface="Cambria Math" charset="0"/>
                         <a:cs typeface="Cambria Math" charset="0"/>
@@ -5737,6 +5695,241 @@
                     </m:r>
                   </m:oMath>
                 </a14:m>
+                <a:endParaRPr lang="en-US" dirty="0" smtClean="0"/>
+              </a:p>
+              <a:p>
+                <a:pPr marL="0" lvl="1" indent="0">
+                  <a:spcBef>
+                    <a:spcPts val="1200"/>
+                  </a:spcBef>
+                  <a:spcAft>
+                    <a:spcPts val="200"/>
+                  </a:spcAft>
+                  <a:buSzPct val="100000"/>
+                  <a:buNone/>
+                </a:pPr>
+                <a:r>
+                  <a:rPr lang="en-US" sz="1900" dirty="0" smtClean="0"/>
+                  <a:t> So, </a:t>
+                </a:r>
+                <a14:m>
+                  <m:oMath xmlns:m="http://schemas.openxmlformats.org/officeDocument/2006/math">
+                    <m:r>
+                      <a:rPr lang="en-US" sz="1900" i="1">
+                        <a:latin typeface="Cambria Math" charset="0"/>
+                        <a:ea typeface="Cambria Math" charset="0"/>
+                        <a:cs typeface="Cambria Math" charset="0"/>
+                      </a:rPr>
+                      <m:t>𝑌</m:t>
+                    </m:r>
+                    <m:r>
+                      <a:rPr lang="en-US" sz="1900" i="1">
+                        <a:latin typeface="Cambria Math" charset="0"/>
+                        <a:ea typeface="Cambria Math" charset="0"/>
+                        <a:cs typeface="Cambria Math" charset="0"/>
+                      </a:rPr>
+                      <m:t>−</m:t>
+                    </m:r>
+                    <m:d>
+                      <m:dPr>
+                        <m:ctrlPr>
+                          <a:rPr lang="en-US" sz="1900" i="1">
+                            <a:latin typeface="Cambria Math" charset="0"/>
+                            <a:ea typeface="Cambria Math" charset="0"/>
+                            <a:cs typeface="Cambria Math" charset="0"/>
+                          </a:rPr>
+                        </m:ctrlPr>
+                      </m:dPr>
+                      <m:e>
+                        <m:acc>
+                          <m:accPr>
+                            <m:chr m:val="̂"/>
+                            <m:ctrlPr>
+                              <a:rPr lang="en-US" sz="1900" i="1">
+                                <a:latin typeface="Cambria Math" charset="0"/>
+                                <a:ea typeface="Cambria Math" charset="0"/>
+                                <a:cs typeface="Cambria Math" charset="0"/>
+                              </a:rPr>
+                            </m:ctrlPr>
+                          </m:accPr>
+                          <m:e>
+                            <m:sSub>
+                              <m:sSubPr>
+                                <m:ctrlPr>
+                                  <a:rPr lang="en-US" sz="1900" i="1">
+                                    <a:latin typeface="Cambria Math" charset="0"/>
+                                    <a:ea typeface="Cambria Math" charset="0"/>
+                                    <a:cs typeface="Cambria Math" charset="0"/>
+                                  </a:rPr>
+                                </m:ctrlPr>
+                              </m:sSubPr>
+                              <m:e>
+                                <m:r>
+                                  <a:rPr lang="en-US" sz="1900" i="1">
+                                    <a:latin typeface="Cambria Math" charset="0"/>
+                                    <a:ea typeface="Cambria Math" charset="0"/>
+                                    <a:cs typeface="Cambria Math" charset="0"/>
+                                  </a:rPr>
+                                  <m:t>𝛽</m:t>
+                                </m:r>
+                              </m:e>
+                              <m:sub>
+                                <m:r>
+                                  <a:rPr lang="en-US" sz="1900" i="1">
+                                    <a:latin typeface="Cambria Math" charset="0"/>
+                                    <a:ea typeface="Cambria Math" charset="0"/>
+                                    <a:cs typeface="Cambria Math" charset="0"/>
+                                  </a:rPr>
+                                  <m:t>0</m:t>
+                                </m:r>
+                              </m:sub>
+                            </m:sSub>
+                          </m:e>
+                        </m:acc>
+                        <m:r>
+                          <a:rPr lang="en-US" sz="1900" i="1">
+                            <a:latin typeface="Cambria Math" charset="0"/>
+                            <a:ea typeface="Cambria Math" charset="0"/>
+                            <a:cs typeface="Cambria Math" charset="0"/>
+                          </a:rPr>
+                          <m:t>+</m:t>
+                        </m:r>
+                        <m:nary>
+                          <m:naryPr>
+                            <m:chr m:val="∑"/>
+                            <m:ctrlPr>
+                              <a:rPr lang="is-IS" sz="1900" i="1">
+                                <a:latin typeface="Cambria Math" charset="0"/>
+                                <a:ea typeface="Cambria Math" charset="0"/>
+                                <a:cs typeface="Cambria Math" charset="0"/>
+                              </a:rPr>
+                            </m:ctrlPr>
+                          </m:naryPr>
+                          <m:sub>
+                            <m:r>
+                              <m:rPr>
+                                <m:brk m:alnAt="23"/>
+                              </m:rPr>
+                              <a:rPr lang="en-US" sz="1900" i="1">
+                                <a:latin typeface="Cambria Math" charset="0"/>
+                                <a:ea typeface="Cambria Math" charset="0"/>
+                                <a:cs typeface="Cambria Math" charset="0"/>
+                              </a:rPr>
+                              <m:t>𝑗</m:t>
+                            </m:r>
+                            <m:r>
+                              <a:rPr lang="en-US" sz="1900" i="1">
+                                <a:latin typeface="Cambria Math" charset="0"/>
+                                <a:ea typeface="Cambria Math" charset="0"/>
+                                <a:cs typeface="Cambria Math" charset="0"/>
+                              </a:rPr>
+                              <m:t>=1</m:t>
+                            </m:r>
+                          </m:sub>
+                          <m:sup>
+                            <m:r>
+                              <a:rPr lang="en-US" sz="1900" i="1">
+                                <a:latin typeface="Cambria Math" charset="0"/>
+                                <a:ea typeface="Cambria Math" charset="0"/>
+                                <a:cs typeface="Cambria Math" charset="0"/>
+                              </a:rPr>
+                              <m:t>𝑝</m:t>
+                            </m:r>
+                          </m:sup>
+                          <m:e>
+                            <m:acc>
+                              <m:accPr>
+                                <m:chr m:val="̂"/>
+                                <m:ctrlPr>
+                                  <a:rPr lang="en-US" sz="1900" i="1">
+                                    <a:latin typeface="Cambria Math" charset="0"/>
+                                    <a:ea typeface="Cambria Math" charset="0"/>
+                                    <a:cs typeface="Cambria Math" charset="0"/>
+                                  </a:rPr>
+                                </m:ctrlPr>
+                              </m:accPr>
+                              <m:e>
+                                <m:sSub>
+                                  <m:sSubPr>
+                                    <m:ctrlPr>
+                                      <a:rPr lang="en-US" sz="1900" i="1">
+                                        <a:latin typeface="Cambria Math" charset="0"/>
+                                        <a:ea typeface="Cambria Math" charset="0"/>
+                                        <a:cs typeface="Cambria Math" charset="0"/>
+                                      </a:rPr>
+                                    </m:ctrlPr>
+                                  </m:sSubPr>
+                                  <m:e>
+                                    <m:r>
+                                      <a:rPr lang="en-US" sz="1900" i="1">
+                                        <a:latin typeface="Cambria Math" charset="0"/>
+                                        <a:ea typeface="Cambria Math" charset="0"/>
+                                        <a:cs typeface="Cambria Math" charset="0"/>
+                                      </a:rPr>
+                                      <m:t>𝛽</m:t>
+                                    </m:r>
+                                  </m:e>
+                                  <m:sub>
+                                    <m:r>
+                                      <a:rPr lang="en-US" sz="1900" i="1">
+                                        <a:latin typeface="Cambria Math" charset="0"/>
+                                        <a:ea typeface="Cambria Math" charset="0"/>
+                                        <a:cs typeface="Cambria Math" charset="0"/>
+                                      </a:rPr>
+                                      <m:t>𝑗</m:t>
+                                    </m:r>
+                                  </m:sub>
+                                </m:sSub>
+                              </m:e>
+                            </m:acc>
+                            <m:sSub>
+                              <m:sSubPr>
+                                <m:ctrlPr>
+                                  <a:rPr lang="en-US" sz="1900" i="1">
+                                    <a:latin typeface="Cambria Math" charset="0"/>
+                                  </a:rPr>
+                                </m:ctrlPr>
+                              </m:sSubPr>
+                              <m:e>
+                                <m:r>
+                                  <a:rPr lang="en-US" sz="1900" i="1">
+                                    <a:latin typeface="Cambria Math" charset="0"/>
+                                  </a:rPr>
+                                  <m:t>𝑥</m:t>
+                                </m:r>
+                              </m:e>
+                              <m:sub>
+                                <m:r>
+                                  <a:rPr lang="en-US" sz="1900" i="1">
+                                    <a:latin typeface="Cambria Math" charset="0"/>
+                                  </a:rPr>
+                                  <m:t>𝑗</m:t>
+                                </m:r>
+                              </m:sub>
+                            </m:sSub>
+                          </m:e>
+                        </m:nary>
+                      </m:e>
+                    </m:d>
+                    <m:r>
+                      <a:rPr lang="en-US" sz="1900" b="0" i="1" smtClean="0">
+                        <a:latin typeface="Cambria Math" charset="0"/>
+                      </a:rPr>
+                      <m:t>=</m:t>
+                    </m:r>
+                  </m:oMath>
+                </a14:m>
+                <a:r>
+                  <a:rPr lang="en-US" sz="1900" dirty="0" smtClean="0"/>
+                  <a:t> Approximation error + Estimation error + Irreducible Error</a:t>
+                </a:r>
+                <a:endParaRPr lang="en-US" sz="1900" dirty="0"/>
+              </a:p>
+              <a:p>
+                <a:pPr>
+                  <a:buFont typeface="Arial" charset="0"/>
+                  <a:buChar char="•"/>
+                </a:pPr>
                 <a:endParaRPr lang="en-US" dirty="0"/>
               </a:p>
               <a:p>
@@ -5950,7 +6143,7 @@
               <a:blipFill rotWithShape="0">
                 <a:blip r:embed="rId2"/>
                 <a:stretch>
-                  <a:fillRect l="-1758" t="-1667"/>
+                  <a:fillRect l="-1612" t="-1970" b="-1667"/>
                 </a:stretch>
               </a:blipFill>
             </p:spPr>
@@ -6002,6 +6195,13 @@
   <p:clrMapOvr>
     <a:masterClrMapping/>
   </p:clrMapOvr>
+  <p:timing>
+    <p:tnLst>
+      <p:par>
+        <p:cTn id="1" dur="indefinite" restart="never" nodeType="tmRoot"/>
+      </p:par>
+    </p:tnLst>
+  </p:timing>
 </p:sld>
 </file>
 
@@ -6824,6 +7024,13 @@
   <p:clrMapOvr>
     <a:masterClrMapping/>
   </p:clrMapOvr>
+  <p:timing>
+    <p:tnLst>
+      <p:par>
+        <p:cTn id="1" dur="indefinite" restart="never" nodeType="tmRoot"/>
+      </p:par>
+    </p:tnLst>
+  </p:timing>
 </p:sld>
 </file>
 
@@ -9509,6 +9716,13 @@
   <p:clrMapOvr>
     <a:masterClrMapping/>
   </p:clrMapOvr>
+  <p:timing>
+    <p:tnLst>
+      <p:par>
+        <p:cTn id="1" dur="indefinite" restart="never" nodeType="tmRoot"/>
+      </p:par>
+    </p:tnLst>
+  </p:timing>
 </p:sld>
 </file>
 
@@ -10235,6 +10449,13 @@
   <p:clrMapOvr>
     <a:masterClrMapping/>
   </p:clrMapOvr>
+  <p:timing>
+    <p:tnLst>
+      <p:par>
+        <p:cTn id="1" dur="indefinite" restart="never" nodeType="tmRoot"/>
+      </p:par>
+    </p:tnLst>
+  </p:timing>
 </p:sld>
 </file>
 

</xml_diff>